<commit_message>
output interface as jpg
</commit_message>
<xml_diff>
--- a/zosma/interface/ui.pptx
+++ b/zosma/interface/ui.pptx
@@ -193,7 +193,7 @@
           <a:p>
             <a:fld id="{EE82FEE5-269B-9B49-A8C4-823C45BE6055}" type="datetimeFigureOut">
               <a:rPr kumimoji="1" lang="ja-JP" altLang="en-US" smtClean="0"/>
-              <a:t>16/09/16</a:t>
+              <a:t>16/09/17</a:t>
             </a:fld>
             <a:endParaRPr kumimoji="1" lang="ja-JP" altLang="en-US"/>
           </a:p>
@@ -674,7 +674,7 @@
           <a:p>
             <a:fld id="{3ABA01A1-4899-9944-833D-6A66CDE659CB}" type="datetimeFigureOut">
               <a:rPr kumimoji="1" lang="ja-JP" altLang="en-US" smtClean="0"/>
-              <a:t>16/09/16</a:t>
+              <a:t>16/09/17</a:t>
             </a:fld>
             <a:endParaRPr kumimoji="1" lang="ja-JP" altLang="en-US"/>
           </a:p>
@@ -876,7 +876,7 @@
           <a:p>
             <a:fld id="{3ABA01A1-4899-9944-833D-6A66CDE659CB}" type="datetimeFigureOut">
               <a:rPr kumimoji="1" lang="ja-JP" altLang="en-US" smtClean="0"/>
-              <a:t>16/09/16</a:t>
+              <a:t>16/09/17</a:t>
             </a:fld>
             <a:endParaRPr kumimoji="1" lang="ja-JP" altLang="en-US"/>
           </a:p>
@@ -1088,7 +1088,7 @@
           <a:p>
             <a:fld id="{3ABA01A1-4899-9944-833D-6A66CDE659CB}" type="datetimeFigureOut">
               <a:rPr kumimoji="1" lang="ja-JP" altLang="en-US" smtClean="0"/>
-              <a:t>16/09/16</a:t>
+              <a:t>16/09/17</a:t>
             </a:fld>
             <a:endParaRPr kumimoji="1" lang="ja-JP" altLang="en-US"/>
           </a:p>
@@ -1290,7 +1290,7 @@
           <a:p>
             <a:fld id="{3ABA01A1-4899-9944-833D-6A66CDE659CB}" type="datetimeFigureOut">
               <a:rPr kumimoji="1" lang="ja-JP" altLang="en-US" smtClean="0"/>
-              <a:t>16/09/16</a:t>
+              <a:t>16/09/17</a:t>
             </a:fld>
             <a:endParaRPr kumimoji="1" lang="ja-JP" altLang="en-US"/>
           </a:p>
@@ -1536,7 +1536,7 @@
           <a:p>
             <a:fld id="{3ABA01A1-4899-9944-833D-6A66CDE659CB}" type="datetimeFigureOut">
               <a:rPr kumimoji="1" lang="ja-JP" altLang="en-US" smtClean="0"/>
-              <a:t>16/09/16</a:t>
+              <a:t>16/09/17</a:t>
             </a:fld>
             <a:endParaRPr kumimoji="1" lang="ja-JP" altLang="en-US"/>
           </a:p>
@@ -1888,7 +1888,7 @@
           <a:p>
             <a:fld id="{3ABA01A1-4899-9944-833D-6A66CDE659CB}" type="datetimeFigureOut">
               <a:rPr kumimoji="1" lang="ja-JP" altLang="en-US" smtClean="0"/>
-              <a:t>16/09/16</a:t>
+              <a:t>16/09/17</a:t>
             </a:fld>
             <a:endParaRPr kumimoji="1" lang="ja-JP" altLang="en-US"/>
           </a:p>
@@ -2374,7 +2374,7 @@
           <a:p>
             <a:fld id="{3ABA01A1-4899-9944-833D-6A66CDE659CB}" type="datetimeFigureOut">
               <a:rPr kumimoji="1" lang="ja-JP" altLang="en-US" smtClean="0"/>
-              <a:t>16/09/16</a:t>
+              <a:t>16/09/17</a:t>
             </a:fld>
             <a:endParaRPr kumimoji="1" lang="ja-JP" altLang="en-US"/>
           </a:p>
@@ -2492,7 +2492,7 @@
           <a:p>
             <a:fld id="{3ABA01A1-4899-9944-833D-6A66CDE659CB}" type="datetimeFigureOut">
               <a:rPr kumimoji="1" lang="ja-JP" altLang="en-US" smtClean="0"/>
-              <a:t>16/09/16</a:t>
+              <a:t>16/09/17</a:t>
             </a:fld>
             <a:endParaRPr kumimoji="1" lang="ja-JP" altLang="en-US"/>
           </a:p>
@@ -2587,7 +2587,7 @@
           <a:p>
             <a:fld id="{3ABA01A1-4899-9944-833D-6A66CDE659CB}" type="datetimeFigureOut">
               <a:rPr kumimoji="1" lang="ja-JP" altLang="en-US" smtClean="0"/>
-              <a:t>16/09/16</a:t>
+              <a:t>16/09/17</a:t>
             </a:fld>
             <a:endParaRPr kumimoji="1" lang="ja-JP" altLang="en-US"/>
           </a:p>
@@ -2896,7 +2896,7 @@
           <a:p>
             <a:fld id="{3ABA01A1-4899-9944-833D-6A66CDE659CB}" type="datetimeFigureOut">
               <a:rPr kumimoji="1" lang="ja-JP" altLang="en-US" smtClean="0"/>
-              <a:t>16/09/16</a:t>
+              <a:t>16/09/17</a:t>
             </a:fld>
             <a:endParaRPr kumimoji="1" lang="ja-JP" altLang="en-US"/>
           </a:p>
@@ -3149,7 +3149,7 @@
           <a:p>
             <a:fld id="{3ABA01A1-4899-9944-833D-6A66CDE659CB}" type="datetimeFigureOut">
               <a:rPr kumimoji="1" lang="ja-JP" altLang="en-US" smtClean="0"/>
-              <a:t>16/09/16</a:t>
+              <a:t>16/09/17</a:t>
             </a:fld>
             <a:endParaRPr kumimoji="1" lang="ja-JP" altLang="en-US"/>
           </a:p>
@@ -3394,7 +3394,7 @@
           <a:p>
             <a:fld id="{3ABA01A1-4899-9944-833D-6A66CDE659CB}" type="datetimeFigureOut">
               <a:rPr kumimoji="1" lang="ja-JP" altLang="en-US" smtClean="0"/>
-              <a:t>16/09/16</a:t>
+              <a:t>16/09/17</a:t>
             </a:fld>
             <a:endParaRPr kumimoji="1" lang="ja-JP" altLang="en-US"/>
           </a:p>
@@ -3830,15 +3830,7 @@
             </a:r>
             <a:r>
               <a:rPr lang="en-US" altLang="ja-JP" sz="2800" dirty="0" smtClean="0"/>
-              <a:t>2016/</a:t>
-            </a:r>
-            <a:r>
-              <a:rPr lang="en-US" altLang="ja-JP" sz="2800" dirty="0" smtClean="0"/>
-              <a:t>09/16</a:t>
-            </a:r>
-            <a:r>
-              <a:rPr lang="en-US" altLang="ja-JP" sz="2800" dirty="0" smtClean="0"/>
-              <a:t/>
+              <a:t>2016/09/16</a:t>
             </a:r>
             <a:br>
               <a:rPr lang="en-US" altLang="ja-JP" sz="2800" dirty="0" smtClean="0"/>
@@ -3849,11 +3841,7 @@
             </a:r>
             <a:r>
               <a:rPr lang="en-US" altLang="ja-JP" sz="2800" dirty="0" smtClean="0"/>
-              <a:t> </a:t>
-            </a:r>
-            <a:r>
-              <a:rPr lang="en-US" altLang="ja-JP" sz="2800" dirty="0" smtClean="0"/>
-              <a:t>1.1.0</a:t>
+              <a:t> 1.1.0</a:t>
             </a:r>
             <a:endParaRPr kumimoji="1" lang="ja-JP" altLang="en-US" dirty="0"/>
           </a:p>
@@ -3937,7 +3925,7 @@
       </p:sp>
       <p:grpSp>
         <p:nvGrpSpPr>
-          <p:cNvPr id="3" name="図形グループ 2"/>
+          <p:cNvPr id="8" name="図形グループ 7"/>
           <p:cNvGrpSpPr/>
           <p:nvPr/>
         </p:nvGrpSpPr>
@@ -4572,332 +4560,332 @@
             </a:p>
           </p:txBody>
         </p:sp>
-      </p:grpSp>
-      <p:sp>
-        <p:nvSpPr>
-          <p:cNvPr id="4" name="テキスト ボックス 3"/>
-          <p:cNvSpPr txBox="1"/>
-          <p:nvPr/>
-        </p:nvSpPr>
-        <p:spPr>
-          <a:xfrm>
-            <a:off x="6831667" y="1083557"/>
-            <a:ext cx="312906" cy="246221"/>
-          </a:xfrm>
-          <a:prstGeom prst="rect">
-            <a:avLst/>
-          </a:prstGeom>
-          <a:noFill/>
-        </p:spPr>
-        <p:txBody>
-          <a:bodyPr wrap="none" rtlCol="0">
-            <a:spAutoFit/>
-          </a:bodyPr>
-          <a:lstStyle/>
-          <a:p>
-            <a:r>
-              <a:rPr kumimoji="1" lang="en-US" altLang="ja-JP" sz="1000" dirty="0" smtClean="0"/>
-              <a:t>〜</a:t>
-            </a:r>
-            <a:endParaRPr kumimoji="1" lang="ja-JP" altLang="en-US" sz="1000" dirty="0"/>
-          </a:p>
-        </p:txBody>
-      </p:sp>
-      <p:sp>
-        <p:nvSpPr>
-          <p:cNvPr id="24" name="テキスト ボックス 23"/>
-          <p:cNvSpPr txBox="1"/>
-          <p:nvPr/>
-        </p:nvSpPr>
-        <p:spPr>
-          <a:xfrm>
-            <a:off x="1560343" y="1076371"/>
-            <a:ext cx="312906" cy="246221"/>
-          </a:xfrm>
-          <a:prstGeom prst="rect">
-            <a:avLst/>
-          </a:prstGeom>
-          <a:noFill/>
-        </p:spPr>
-        <p:txBody>
-          <a:bodyPr wrap="none" rtlCol="0">
-            <a:spAutoFit/>
-          </a:bodyPr>
-          <a:lstStyle/>
-          <a:p>
-            <a:r>
-              <a:rPr kumimoji="1" lang="en-US" altLang="ja-JP" sz="1000" dirty="0" smtClean="0"/>
-              <a:t>〜</a:t>
-            </a:r>
-            <a:endParaRPr kumimoji="1" lang="ja-JP" altLang="en-US" sz="1000" dirty="0"/>
-          </a:p>
-        </p:txBody>
-      </p:sp>
-      <p:sp>
-        <p:nvSpPr>
-          <p:cNvPr id="25" name="角丸四角形 24"/>
-          <p:cNvSpPr/>
-          <p:nvPr/>
-        </p:nvSpPr>
-        <p:spPr>
-          <a:xfrm>
-            <a:off x="1873249" y="1097215"/>
-            <a:ext cx="642786" cy="209606"/>
-          </a:xfrm>
-          <a:prstGeom prst="roundRect">
-            <a:avLst/>
-          </a:prstGeom>
-          <a:noFill/>
-          <a:ln w="25400">
-            <a:solidFill>
-              <a:schemeClr val="tx1"/>
-            </a:solidFill>
-          </a:ln>
-          <a:effectLst/>
-        </p:spPr>
-        <p:style>
-          <a:lnRef idx="1">
-            <a:schemeClr val="accent1"/>
-          </a:lnRef>
-          <a:fillRef idx="3">
-            <a:schemeClr val="accent1"/>
-          </a:fillRef>
-          <a:effectRef idx="2">
-            <a:schemeClr val="accent1"/>
-          </a:effectRef>
-          <a:fontRef idx="minor">
-            <a:schemeClr val="lt1"/>
-          </a:fontRef>
-        </p:style>
-        <p:txBody>
-          <a:bodyPr rtlCol="0" anchor="ctr"/>
-          <a:lstStyle/>
-          <a:p>
-            <a:pPr algn="ctr"/>
-            <a:endParaRPr kumimoji="1" lang="ja-JP" altLang="en-US" dirty="0">
+        <p:sp>
+          <p:nvSpPr>
+            <p:cNvPr id="4" name="テキスト ボックス 3"/>
+            <p:cNvSpPr txBox="1"/>
+            <p:nvPr/>
+          </p:nvSpPr>
+          <p:spPr>
+            <a:xfrm>
+              <a:off x="6831667" y="1083557"/>
+              <a:ext cx="312906" cy="246221"/>
+            </a:xfrm>
+            <a:prstGeom prst="rect">
+              <a:avLst/>
+            </a:prstGeom>
+            <a:noFill/>
+          </p:spPr>
+          <p:txBody>
+            <a:bodyPr wrap="none" rtlCol="0">
+              <a:spAutoFit/>
+            </a:bodyPr>
+            <a:lstStyle/>
+            <a:p>
+              <a:r>
+                <a:rPr kumimoji="1" lang="en-US" altLang="ja-JP" sz="1000" dirty="0" smtClean="0"/>
+                <a:t>〜</a:t>
+              </a:r>
+              <a:endParaRPr kumimoji="1" lang="ja-JP" altLang="en-US" sz="1000" dirty="0"/>
+            </a:p>
+          </p:txBody>
+        </p:sp>
+        <p:sp>
+          <p:nvSpPr>
+            <p:cNvPr id="24" name="テキスト ボックス 23"/>
+            <p:cNvSpPr txBox="1"/>
+            <p:nvPr/>
+          </p:nvSpPr>
+          <p:spPr>
+            <a:xfrm>
+              <a:off x="1560343" y="1076371"/>
+              <a:ext cx="312906" cy="246221"/>
+            </a:xfrm>
+            <a:prstGeom prst="rect">
+              <a:avLst/>
+            </a:prstGeom>
+            <a:noFill/>
+          </p:spPr>
+          <p:txBody>
+            <a:bodyPr wrap="none" rtlCol="0">
+              <a:spAutoFit/>
+            </a:bodyPr>
+            <a:lstStyle/>
+            <a:p>
+              <a:r>
+                <a:rPr kumimoji="1" lang="en-US" altLang="ja-JP" sz="1000" dirty="0" smtClean="0"/>
+                <a:t>〜</a:t>
+              </a:r>
+              <a:endParaRPr kumimoji="1" lang="ja-JP" altLang="en-US" sz="1000" dirty="0"/>
+            </a:p>
+          </p:txBody>
+        </p:sp>
+        <p:sp>
+          <p:nvSpPr>
+            <p:cNvPr id="25" name="角丸四角形 24"/>
+            <p:cNvSpPr/>
+            <p:nvPr/>
+          </p:nvSpPr>
+          <p:spPr>
+            <a:xfrm>
+              <a:off x="1873249" y="1097215"/>
+              <a:ext cx="642786" cy="209606"/>
+            </a:xfrm>
+            <a:prstGeom prst="roundRect">
+              <a:avLst/>
+            </a:prstGeom>
+            <a:noFill/>
+            <a:ln w="25400">
               <a:solidFill>
-                <a:srgbClr val="000000"/>
+                <a:schemeClr val="tx1"/>
               </a:solidFill>
-              <a:latin typeface="メイリオ"/>
-              <a:ea typeface="メイリオ"/>
-              <a:cs typeface="メイリオ"/>
-            </a:endParaRPr>
-          </a:p>
-        </p:txBody>
-      </p:sp>
-      <p:sp>
-        <p:nvSpPr>
-          <p:cNvPr id="26" name="角丸四角形 25"/>
-          <p:cNvSpPr/>
-          <p:nvPr/>
-        </p:nvSpPr>
-        <p:spPr>
-          <a:xfrm>
-            <a:off x="3661177" y="1101512"/>
-            <a:ext cx="910482" cy="203703"/>
-          </a:xfrm>
-          <a:prstGeom prst="roundRect">
-            <a:avLst/>
-          </a:prstGeom>
-          <a:noFill/>
-          <a:ln w="25400">
-            <a:solidFill>
-              <a:schemeClr val="tx1"/>
-            </a:solidFill>
-          </a:ln>
-          <a:effectLst/>
-        </p:spPr>
-        <p:style>
-          <a:lnRef idx="1">
-            <a:schemeClr val="accent1"/>
-          </a:lnRef>
-          <a:fillRef idx="3">
-            <a:schemeClr val="accent1"/>
-          </a:fillRef>
-          <a:effectRef idx="2">
-            <a:schemeClr val="accent1"/>
-          </a:effectRef>
-          <a:fontRef idx="minor">
-            <a:schemeClr val="lt1"/>
-          </a:fontRef>
-        </p:style>
-        <p:txBody>
-          <a:bodyPr rtlCol="0" anchor="ctr"/>
-          <a:lstStyle/>
-          <a:p>
-            <a:r>
-              <a:rPr lang="ja-JP" altLang="en-US" sz="800" dirty="0" smtClean="0">
+            </a:ln>
+            <a:effectLst/>
+          </p:spPr>
+          <p:style>
+            <a:lnRef idx="1">
+              <a:schemeClr val="accent1"/>
+            </a:lnRef>
+            <a:fillRef idx="3">
+              <a:schemeClr val="accent1"/>
+            </a:fillRef>
+            <a:effectRef idx="2">
+              <a:schemeClr val="accent1"/>
+            </a:effectRef>
+            <a:fontRef idx="minor">
+              <a:schemeClr val="lt1"/>
+            </a:fontRef>
+          </p:style>
+          <p:txBody>
+            <a:bodyPr rtlCol="0" anchor="ctr"/>
+            <a:lstStyle/>
+            <a:p>
+              <a:pPr algn="ctr"/>
+              <a:endParaRPr kumimoji="1" lang="ja-JP" altLang="en-US" dirty="0">
                 <a:solidFill>
                   <a:srgbClr val="000000"/>
                 </a:solidFill>
                 <a:latin typeface="メイリオ"/>
                 <a:ea typeface="メイリオ"/>
                 <a:cs typeface="メイリオ"/>
-              </a:rPr>
-              <a:t>と一致する</a:t>
-            </a:r>
-            <a:endParaRPr kumimoji="1" lang="ja-JP" altLang="en-US" sz="800" dirty="0">
+              </a:endParaRPr>
+            </a:p>
+          </p:txBody>
+        </p:sp>
+        <p:sp>
+          <p:nvSpPr>
+            <p:cNvPr id="26" name="角丸四角形 25"/>
+            <p:cNvSpPr/>
+            <p:nvPr/>
+          </p:nvSpPr>
+          <p:spPr>
+            <a:xfrm>
+              <a:off x="3661177" y="1101512"/>
+              <a:ext cx="910482" cy="203703"/>
+            </a:xfrm>
+            <a:prstGeom prst="roundRect">
+              <a:avLst/>
+            </a:prstGeom>
+            <a:noFill/>
+            <a:ln w="25400">
               <a:solidFill>
-                <a:srgbClr val="000000"/>
+                <a:schemeClr val="tx1"/>
               </a:solidFill>
-              <a:latin typeface="メイリオ"/>
-              <a:ea typeface="メイリオ"/>
-              <a:cs typeface="メイリオ"/>
-            </a:endParaRPr>
-          </a:p>
-        </p:txBody>
-      </p:sp>
-      <p:sp>
-        <p:nvSpPr>
-          <p:cNvPr id="7" name="二等辺三角形 6"/>
-          <p:cNvSpPr/>
-          <p:nvPr/>
-        </p:nvSpPr>
-        <p:spPr>
-          <a:xfrm flipH="1" flipV="1">
-            <a:off x="4381832" y="1148614"/>
-            <a:ext cx="108000" cy="108000"/>
-          </a:xfrm>
-          <a:prstGeom prst="triangle">
-            <a:avLst/>
-          </a:prstGeom>
-          <a:solidFill>
-            <a:schemeClr val="tx1"/>
-          </a:solidFill>
-          <a:ln>
+            </a:ln>
+            <a:effectLst/>
+          </p:spPr>
+          <p:style>
+            <a:lnRef idx="1">
+              <a:schemeClr val="accent1"/>
+            </a:lnRef>
+            <a:fillRef idx="3">
+              <a:schemeClr val="accent1"/>
+            </a:fillRef>
+            <a:effectRef idx="2">
+              <a:schemeClr val="accent1"/>
+            </a:effectRef>
+            <a:fontRef idx="minor">
+              <a:schemeClr val="lt1"/>
+            </a:fontRef>
+          </p:style>
+          <p:txBody>
+            <a:bodyPr rtlCol="0" anchor="ctr"/>
+            <a:lstStyle/>
+            <a:p>
+              <a:r>
+                <a:rPr lang="ja-JP" altLang="en-US" sz="800" dirty="0" smtClean="0">
+                  <a:solidFill>
+                    <a:srgbClr val="000000"/>
+                  </a:solidFill>
+                  <a:latin typeface="メイリオ"/>
+                  <a:ea typeface="メイリオ"/>
+                  <a:cs typeface="メイリオ"/>
+                </a:rPr>
+                <a:t>と一致する</a:t>
+              </a:r>
+              <a:endParaRPr kumimoji="1" lang="ja-JP" altLang="en-US" sz="800" dirty="0">
+                <a:solidFill>
+                  <a:srgbClr val="000000"/>
+                </a:solidFill>
+                <a:latin typeface="メイリオ"/>
+                <a:ea typeface="メイリオ"/>
+                <a:cs typeface="メイリオ"/>
+              </a:endParaRPr>
+            </a:p>
+          </p:txBody>
+        </p:sp>
+        <p:sp>
+          <p:nvSpPr>
+            <p:cNvPr id="7" name="二等辺三角形 6"/>
+            <p:cNvSpPr/>
+            <p:nvPr/>
+          </p:nvSpPr>
+          <p:spPr>
+            <a:xfrm flipH="1" flipV="1">
+              <a:off x="4381832" y="1148614"/>
+              <a:ext cx="108000" cy="108000"/>
+            </a:xfrm>
+            <a:prstGeom prst="triangle">
+              <a:avLst/>
+            </a:prstGeom>
             <a:solidFill>
               <a:schemeClr val="tx1"/>
             </a:solidFill>
-          </a:ln>
-          <a:effectLst/>
-        </p:spPr>
-        <p:style>
-          <a:lnRef idx="1">
-            <a:schemeClr val="accent1"/>
-          </a:lnRef>
-          <a:fillRef idx="3">
-            <a:schemeClr val="accent1"/>
-          </a:fillRef>
-          <a:effectRef idx="2">
-            <a:schemeClr val="accent1"/>
-          </a:effectRef>
-          <a:fontRef idx="minor">
-            <a:schemeClr val="lt1"/>
-          </a:fontRef>
-        </p:style>
-        <p:txBody>
-          <a:bodyPr rtlCol="0" anchor="ctr"/>
-          <a:lstStyle/>
-          <a:p>
-            <a:pPr algn="ctr"/>
-            <a:endParaRPr kumimoji="1" lang="ja-JP" altLang="en-US"/>
-          </a:p>
-        </p:txBody>
-      </p:sp>
-      <p:sp>
-        <p:nvSpPr>
-          <p:cNvPr id="27" name="角丸四角形 26"/>
-          <p:cNvSpPr/>
-          <p:nvPr/>
-        </p:nvSpPr>
-        <p:spPr>
-          <a:xfrm>
-            <a:off x="6206129" y="1091915"/>
-            <a:ext cx="642786" cy="209606"/>
-          </a:xfrm>
-          <a:prstGeom prst="roundRect">
-            <a:avLst/>
-          </a:prstGeom>
-          <a:noFill/>
-          <a:ln w="25400">
-            <a:solidFill>
-              <a:schemeClr val="tx1"/>
-            </a:solidFill>
-          </a:ln>
-          <a:effectLst/>
-        </p:spPr>
-        <p:style>
-          <a:lnRef idx="1">
-            <a:schemeClr val="accent1"/>
-          </a:lnRef>
-          <a:fillRef idx="3">
-            <a:schemeClr val="accent1"/>
-          </a:fillRef>
-          <a:effectRef idx="2">
-            <a:schemeClr val="accent1"/>
-          </a:effectRef>
-          <a:fontRef idx="minor">
-            <a:schemeClr val="lt1"/>
-          </a:fontRef>
-        </p:style>
-        <p:txBody>
-          <a:bodyPr rtlCol="0" anchor="ctr"/>
-          <a:lstStyle/>
-          <a:p>
-            <a:pPr algn="ctr"/>
-            <a:endParaRPr kumimoji="1" lang="ja-JP" altLang="en-US" dirty="0">
+            <a:ln>
               <a:solidFill>
-                <a:srgbClr val="000000"/>
+                <a:schemeClr val="tx1"/>
               </a:solidFill>
-              <a:latin typeface="メイリオ"/>
-              <a:ea typeface="メイリオ"/>
-              <a:cs typeface="メイリオ"/>
-            </a:endParaRPr>
-          </a:p>
-        </p:txBody>
-      </p:sp>
-      <p:sp>
-        <p:nvSpPr>
-          <p:cNvPr id="28" name="角丸四角形 27"/>
-          <p:cNvSpPr/>
-          <p:nvPr/>
-        </p:nvSpPr>
-        <p:spPr>
-          <a:xfrm>
-            <a:off x="7123189" y="1091915"/>
-            <a:ext cx="642786" cy="209606"/>
-          </a:xfrm>
-          <a:prstGeom prst="roundRect">
-            <a:avLst/>
-          </a:prstGeom>
-          <a:noFill/>
-          <a:ln w="25400">
-            <a:solidFill>
-              <a:schemeClr val="tx1"/>
-            </a:solidFill>
-          </a:ln>
-          <a:effectLst/>
-        </p:spPr>
-        <p:style>
-          <a:lnRef idx="1">
-            <a:schemeClr val="accent1"/>
-          </a:lnRef>
-          <a:fillRef idx="3">
-            <a:schemeClr val="accent1"/>
-          </a:fillRef>
-          <a:effectRef idx="2">
-            <a:schemeClr val="accent1"/>
-          </a:effectRef>
-          <a:fontRef idx="minor">
-            <a:schemeClr val="lt1"/>
-          </a:fontRef>
-        </p:style>
-        <p:txBody>
-          <a:bodyPr rtlCol="0" anchor="ctr"/>
-          <a:lstStyle/>
-          <a:p>
-            <a:pPr algn="ctr"/>
-            <a:endParaRPr kumimoji="1" lang="ja-JP" altLang="en-US" dirty="0">
+            </a:ln>
+            <a:effectLst/>
+          </p:spPr>
+          <p:style>
+            <a:lnRef idx="1">
+              <a:schemeClr val="accent1"/>
+            </a:lnRef>
+            <a:fillRef idx="3">
+              <a:schemeClr val="accent1"/>
+            </a:fillRef>
+            <a:effectRef idx="2">
+              <a:schemeClr val="accent1"/>
+            </a:effectRef>
+            <a:fontRef idx="minor">
+              <a:schemeClr val="lt1"/>
+            </a:fontRef>
+          </p:style>
+          <p:txBody>
+            <a:bodyPr rtlCol="0" anchor="ctr"/>
+            <a:lstStyle/>
+            <a:p>
+              <a:pPr algn="ctr"/>
+              <a:endParaRPr kumimoji="1" lang="ja-JP" altLang="en-US"/>
+            </a:p>
+          </p:txBody>
+        </p:sp>
+        <p:sp>
+          <p:nvSpPr>
+            <p:cNvPr id="27" name="角丸四角形 26"/>
+            <p:cNvSpPr/>
+            <p:nvPr/>
+          </p:nvSpPr>
+          <p:spPr>
+            <a:xfrm>
+              <a:off x="6206129" y="1091915"/>
+              <a:ext cx="642786" cy="209606"/>
+            </a:xfrm>
+            <a:prstGeom prst="roundRect">
+              <a:avLst/>
+            </a:prstGeom>
+            <a:noFill/>
+            <a:ln w="25400">
               <a:solidFill>
-                <a:srgbClr val="000000"/>
+                <a:schemeClr val="tx1"/>
               </a:solidFill>
-              <a:latin typeface="メイリオ"/>
-              <a:ea typeface="メイリオ"/>
-              <a:cs typeface="メイリオ"/>
-            </a:endParaRPr>
-          </a:p>
-        </p:txBody>
-      </p:sp>
+            </a:ln>
+            <a:effectLst/>
+          </p:spPr>
+          <p:style>
+            <a:lnRef idx="1">
+              <a:schemeClr val="accent1"/>
+            </a:lnRef>
+            <a:fillRef idx="3">
+              <a:schemeClr val="accent1"/>
+            </a:fillRef>
+            <a:effectRef idx="2">
+              <a:schemeClr val="accent1"/>
+            </a:effectRef>
+            <a:fontRef idx="minor">
+              <a:schemeClr val="lt1"/>
+            </a:fontRef>
+          </p:style>
+          <p:txBody>
+            <a:bodyPr rtlCol="0" anchor="ctr"/>
+            <a:lstStyle/>
+            <a:p>
+              <a:pPr algn="ctr"/>
+              <a:endParaRPr kumimoji="1" lang="ja-JP" altLang="en-US" dirty="0">
+                <a:solidFill>
+                  <a:srgbClr val="000000"/>
+                </a:solidFill>
+                <a:latin typeface="メイリオ"/>
+                <a:ea typeface="メイリオ"/>
+                <a:cs typeface="メイリオ"/>
+              </a:endParaRPr>
+            </a:p>
+          </p:txBody>
+        </p:sp>
+        <p:sp>
+          <p:nvSpPr>
+            <p:cNvPr id="28" name="角丸四角形 27"/>
+            <p:cNvSpPr/>
+            <p:nvPr/>
+          </p:nvSpPr>
+          <p:spPr>
+            <a:xfrm>
+              <a:off x="7123189" y="1091915"/>
+              <a:ext cx="642786" cy="209606"/>
+            </a:xfrm>
+            <a:prstGeom prst="roundRect">
+              <a:avLst/>
+            </a:prstGeom>
+            <a:noFill/>
+            <a:ln w="25400">
+              <a:solidFill>
+                <a:schemeClr val="tx1"/>
+              </a:solidFill>
+            </a:ln>
+            <a:effectLst/>
+          </p:spPr>
+          <p:style>
+            <a:lnRef idx="1">
+              <a:schemeClr val="accent1"/>
+            </a:lnRef>
+            <a:fillRef idx="3">
+              <a:schemeClr val="accent1"/>
+            </a:fillRef>
+            <a:effectRef idx="2">
+              <a:schemeClr val="accent1"/>
+            </a:effectRef>
+            <a:fontRef idx="minor">
+              <a:schemeClr val="lt1"/>
+            </a:fontRef>
+          </p:style>
+          <p:txBody>
+            <a:bodyPr rtlCol="0" anchor="ctr"/>
+            <a:lstStyle/>
+            <a:p>
+              <a:pPr algn="ctr"/>
+              <a:endParaRPr kumimoji="1" lang="ja-JP" altLang="en-US" dirty="0">
+                <a:solidFill>
+                  <a:srgbClr val="000000"/>
+                </a:solidFill>
+                <a:latin typeface="メイリオ"/>
+                <a:ea typeface="メイリオ"/>
+                <a:cs typeface="メイリオ"/>
+              </a:endParaRPr>
+            </a:p>
+          </p:txBody>
+        </p:sp>
+      </p:grpSp>
     </p:spTree>
     <p:extLst>
       <p:ext uri="{BB962C8B-B14F-4D97-AF65-F5344CB8AC3E}">

</xml_diff>

<commit_message>
Improve search form (#87)
* update index.rst

* rename requirements spec

* update functional spec

* remove external.rst & interface.rst

* rename internal to design

* modify depth to 1

* update ui

* remove unuse images

* update umls

* modify form methods

* update design spec

* output interface as jpg

* update interface.jpg

* centering images
</commit_message>
<xml_diff>
--- a/zosma/interface/ui.pptx
+++ b/zosma/interface/ui.pptx
@@ -193,7 +193,7 @@
           <a:p>
             <a:fld id="{EE82FEE5-269B-9B49-A8C4-823C45BE6055}" type="datetimeFigureOut">
               <a:rPr kumimoji="1" lang="ja-JP" altLang="en-US" smtClean="0"/>
-              <a:t>16/01/03</a:t>
+              <a:t>16/09/17</a:t>
             </a:fld>
             <a:endParaRPr kumimoji="1" lang="ja-JP" altLang="en-US"/>
           </a:p>
@@ -674,7 +674,7 @@
           <a:p>
             <a:fld id="{3ABA01A1-4899-9944-833D-6A66CDE659CB}" type="datetimeFigureOut">
               <a:rPr kumimoji="1" lang="ja-JP" altLang="en-US" smtClean="0"/>
-              <a:t>16/01/03</a:t>
+              <a:t>16/09/17</a:t>
             </a:fld>
             <a:endParaRPr kumimoji="1" lang="ja-JP" altLang="en-US"/>
           </a:p>
@@ -876,7 +876,7 @@
           <a:p>
             <a:fld id="{3ABA01A1-4899-9944-833D-6A66CDE659CB}" type="datetimeFigureOut">
               <a:rPr kumimoji="1" lang="ja-JP" altLang="en-US" smtClean="0"/>
-              <a:t>16/01/03</a:t>
+              <a:t>16/09/17</a:t>
             </a:fld>
             <a:endParaRPr kumimoji="1" lang="ja-JP" altLang="en-US"/>
           </a:p>
@@ -1088,7 +1088,7 @@
           <a:p>
             <a:fld id="{3ABA01A1-4899-9944-833D-6A66CDE659CB}" type="datetimeFigureOut">
               <a:rPr kumimoji="1" lang="ja-JP" altLang="en-US" smtClean="0"/>
-              <a:t>16/01/03</a:t>
+              <a:t>16/09/17</a:t>
             </a:fld>
             <a:endParaRPr kumimoji="1" lang="ja-JP" altLang="en-US"/>
           </a:p>
@@ -1290,7 +1290,7 @@
           <a:p>
             <a:fld id="{3ABA01A1-4899-9944-833D-6A66CDE659CB}" type="datetimeFigureOut">
               <a:rPr kumimoji="1" lang="ja-JP" altLang="en-US" smtClean="0"/>
-              <a:t>16/01/03</a:t>
+              <a:t>16/09/17</a:t>
             </a:fld>
             <a:endParaRPr kumimoji="1" lang="ja-JP" altLang="en-US"/>
           </a:p>
@@ -1536,7 +1536,7 @@
           <a:p>
             <a:fld id="{3ABA01A1-4899-9944-833D-6A66CDE659CB}" type="datetimeFigureOut">
               <a:rPr kumimoji="1" lang="ja-JP" altLang="en-US" smtClean="0"/>
-              <a:t>16/01/03</a:t>
+              <a:t>16/09/17</a:t>
             </a:fld>
             <a:endParaRPr kumimoji="1" lang="ja-JP" altLang="en-US"/>
           </a:p>
@@ -1888,7 +1888,7 @@
           <a:p>
             <a:fld id="{3ABA01A1-4899-9944-833D-6A66CDE659CB}" type="datetimeFigureOut">
               <a:rPr kumimoji="1" lang="ja-JP" altLang="en-US" smtClean="0"/>
-              <a:t>16/01/03</a:t>
+              <a:t>16/09/17</a:t>
             </a:fld>
             <a:endParaRPr kumimoji="1" lang="ja-JP" altLang="en-US"/>
           </a:p>
@@ -2374,7 +2374,7 @@
           <a:p>
             <a:fld id="{3ABA01A1-4899-9944-833D-6A66CDE659CB}" type="datetimeFigureOut">
               <a:rPr kumimoji="1" lang="ja-JP" altLang="en-US" smtClean="0"/>
-              <a:t>16/01/03</a:t>
+              <a:t>16/09/17</a:t>
             </a:fld>
             <a:endParaRPr kumimoji="1" lang="ja-JP" altLang="en-US"/>
           </a:p>
@@ -2492,7 +2492,7 @@
           <a:p>
             <a:fld id="{3ABA01A1-4899-9944-833D-6A66CDE659CB}" type="datetimeFigureOut">
               <a:rPr kumimoji="1" lang="ja-JP" altLang="en-US" smtClean="0"/>
-              <a:t>16/01/03</a:t>
+              <a:t>16/09/17</a:t>
             </a:fld>
             <a:endParaRPr kumimoji="1" lang="ja-JP" altLang="en-US"/>
           </a:p>
@@ -2587,7 +2587,7 @@
           <a:p>
             <a:fld id="{3ABA01A1-4899-9944-833D-6A66CDE659CB}" type="datetimeFigureOut">
               <a:rPr kumimoji="1" lang="ja-JP" altLang="en-US" smtClean="0"/>
-              <a:t>16/01/03</a:t>
+              <a:t>16/09/17</a:t>
             </a:fld>
             <a:endParaRPr kumimoji="1" lang="ja-JP" altLang="en-US"/>
           </a:p>
@@ -2896,7 +2896,7 @@
           <a:p>
             <a:fld id="{3ABA01A1-4899-9944-833D-6A66CDE659CB}" type="datetimeFigureOut">
               <a:rPr kumimoji="1" lang="ja-JP" altLang="en-US" smtClean="0"/>
-              <a:t>16/01/03</a:t>
+              <a:t>16/09/17</a:t>
             </a:fld>
             <a:endParaRPr kumimoji="1" lang="ja-JP" altLang="en-US"/>
           </a:p>
@@ -3149,7 +3149,7 @@
           <a:p>
             <a:fld id="{3ABA01A1-4899-9944-833D-6A66CDE659CB}" type="datetimeFigureOut">
               <a:rPr kumimoji="1" lang="ja-JP" altLang="en-US" smtClean="0"/>
-              <a:t>16/01/03</a:t>
+              <a:t>16/09/17</a:t>
             </a:fld>
             <a:endParaRPr kumimoji="1" lang="ja-JP" altLang="en-US"/>
           </a:p>
@@ -3394,7 +3394,7 @@
           <a:p>
             <a:fld id="{3ABA01A1-4899-9944-833D-6A66CDE659CB}" type="datetimeFigureOut">
               <a:rPr kumimoji="1" lang="ja-JP" altLang="en-US" smtClean="0"/>
-              <a:t>16/01/03</a:t>
+              <a:t>16/09/17</a:t>
             </a:fld>
             <a:endParaRPr kumimoji="1" lang="ja-JP" altLang="en-US"/>
           </a:p>
@@ -3830,11 +3830,7 @@
             </a:r>
             <a:r>
               <a:rPr lang="en-US" altLang="ja-JP" sz="2800" dirty="0" smtClean="0"/>
-              <a:t>2016/01/</a:t>
-            </a:r>
-            <a:r>
-              <a:rPr lang="en-US" altLang="ja-JP" sz="2800" dirty="0" smtClean="0"/>
-              <a:t>03</a:t>
+              <a:t>2016/09/16</a:t>
             </a:r>
             <a:br>
               <a:rPr lang="en-US" altLang="ja-JP" sz="2800" dirty="0" smtClean="0"/>
@@ -3845,11 +3841,7 @@
             </a:r>
             <a:r>
               <a:rPr lang="en-US" altLang="ja-JP" sz="2800" dirty="0" smtClean="0"/>
-              <a:t> </a:t>
-            </a:r>
-            <a:r>
-              <a:rPr lang="en-US" altLang="ja-JP" sz="2800" dirty="0" smtClean="0"/>
-              <a:t>1.0.0</a:t>
+              <a:t> 1.1.0</a:t>
             </a:r>
             <a:endParaRPr kumimoji="1" lang="ja-JP" altLang="en-US" dirty="0"/>
           </a:p>
@@ -3933,16 +3925,16 @@
       </p:sp>
       <p:grpSp>
         <p:nvGrpSpPr>
-          <p:cNvPr id="3" name="図形グループ 2"/>
+          <p:cNvPr id="8" name="図形グループ 7"/>
           <p:cNvGrpSpPr/>
           <p:nvPr/>
         </p:nvGrpSpPr>
         <p:grpSpPr>
           <a:xfrm>
-            <a:off x="502671" y="1020233"/>
-            <a:ext cx="8082437" cy="5429564"/>
-            <a:chOff x="502671" y="1020233"/>
-            <a:chExt cx="8082437" cy="5429564"/>
+            <a:off x="499501" y="1020233"/>
+            <a:ext cx="8085607" cy="5429564"/>
+            <a:chOff x="499501" y="1020233"/>
+            <a:chExt cx="8085607" cy="5429564"/>
           </a:xfrm>
         </p:grpSpPr>
         <p:sp>
@@ -4084,66 +4076,14 @@
         </p:sp>
         <p:sp>
           <p:nvSpPr>
-            <p:cNvPr id="10" name="角丸四角形 9"/>
-            <p:cNvSpPr/>
-            <p:nvPr/>
-          </p:nvSpPr>
-          <p:spPr>
-            <a:xfrm>
-              <a:off x="6267112" y="1095609"/>
-              <a:ext cx="799543" cy="210618"/>
-            </a:xfrm>
-            <a:prstGeom prst="roundRect">
-              <a:avLst/>
-            </a:prstGeom>
-            <a:noFill/>
-            <a:ln w="25400">
-              <a:solidFill>
-                <a:schemeClr val="tx1"/>
-              </a:solidFill>
-            </a:ln>
-            <a:effectLst/>
-          </p:spPr>
-          <p:style>
-            <a:lnRef idx="1">
-              <a:schemeClr val="accent1"/>
-            </a:lnRef>
-            <a:fillRef idx="3">
-              <a:schemeClr val="accent1"/>
-            </a:fillRef>
-            <a:effectRef idx="2">
-              <a:schemeClr val="accent1"/>
-            </a:effectRef>
-            <a:fontRef idx="minor">
-              <a:schemeClr val="lt1"/>
-            </a:fontRef>
-          </p:style>
-          <p:txBody>
-            <a:bodyPr rtlCol="0" anchor="ctr"/>
-            <a:lstStyle/>
-            <a:p>
-              <a:pPr algn="ctr"/>
-              <a:endParaRPr kumimoji="1" lang="ja-JP" altLang="en-US" dirty="0">
-                <a:solidFill>
-                  <a:srgbClr val="000000"/>
-                </a:solidFill>
-                <a:latin typeface="メイリオ"/>
-                <a:ea typeface="メイリオ"/>
-                <a:cs typeface="メイリオ"/>
-              </a:endParaRPr>
-            </a:p>
-          </p:txBody>
-        </p:sp>
-        <p:sp>
-          <p:nvSpPr>
             <p:cNvPr id="11" name="テキスト ボックス 10"/>
             <p:cNvSpPr txBox="1"/>
             <p:nvPr/>
           </p:nvSpPr>
           <p:spPr>
             <a:xfrm>
-              <a:off x="5697413" y="1045930"/>
-              <a:ext cx="543739" cy="307777"/>
+              <a:off x="5774820" y="1069600"/>
+              <a:ext cx="441146" cy="246221"/>
             </a:xfrm>
             <a:prstGeom prst="rect">
               <a:avLst/>
@@ -4157,14 +4097,14 @@
             <a:lstStyle/>
             <a:p>
               <a:r>
-                <a:rPr lang="ja-JP" altLang="en-US" sz="1400" dirty="0" smtClean="0">
+                <a:rPr lang="ja-JP" altLang="en-US" sz="1000" dirty="0" smtClean="0">
                   <a:latin typeface="メイリオ"/>
                   <a:ea typeface="メイリオ"/>
                   <a:cs typeface="メイリオ"/>
                 </a:rPr>
                 <a:t>金額</a:t>
               </a:r>
-              <a:endParaRPr kumimoji="1" lang="ja-JP" altLang="en-US" sz="1400" dirty="0">
+              <a:endParaRPr kumimoji="1" lang="ja-JP" altLang="en-US" sz="1000" dirty="0">
                 <a:latin typeface="メイリオ"/>
                 <a:ea typeface="メイリオ"/>
                 <a:cs typeface="メイリオ"/>
@@ -4180,8 +4120,8 @@
           </p:nvSpPr>
           <p:spPr>
             <a:xfrm>
-              <a:off x="3971319" y="1045930"/>
-              <a:ext cx="902811" cy="307777"/>
+              <a:off x="4553129" y="1079918"/>
+              <a:ext cx="697627" cy="246221"/>
             </a:xfrm>
             <a:prstGeom prst="rect">
               <a:avLst/>
@@ -4195,14 +4135,14 @@
             <a:lstStyle/>
             <a:p>
               <a:r>
-                <a:rPr lang="ja-JP" altLang="en-US" sz="1400" dirty="0" smtClean="0">
+                <a:rPr lang="ja-JP" altLang="en-US" sz="1000" dirty="0" smtClean="0">
                   <a:latin typeface="メイリオ"/>
                   <a:ea typeface="メイリオ"/>
                   <a:cs typeface="メイリオ"/>
                 </a:rPr>
                 <a:t>カテゴリ</a:t>
               </a:r>
-              <a:endParaRPr kumimoji="1" lang="ja-JP" altLang="en-US" sz="1400" dirty="0">
+              <a:endParaRPr kumimoji="1" lang="ja-JP" altLang="en-US" sz="1000" dirty="0">
                 <a:latin typeface="メイリオ"/>
                 <a:ea typeface="メイリオ"/>
                 <a:cs typeface="メイリオ"/>
@@ -4270,8 +4210,8 @@
           </p:nvSpPr>
           <p:spPr>
             <a:xfrm>
-              <a:off x="4862260" y="1095103"/>
-              <a:ext cx="799543" cy="210618"/>
+              <a:off x="5216121" y="1095102"/>
+              <a:ext cx="558699" cy="210113"/>
             </a:xfrm>
             <a:prstGeom prst="roundRect">
               <a:avLst/>
@@ -4322,8 +4262,8 @@
           </p:nvSpPr>
           <p:spPr>
             <a:xfrm>
-              <a:off x="2435836" y="1095103"/>
-              <a:ext cx="1528588" cy="211124"/>
+              <a:off x="2957181" y="1099003"/>
+              <a:ext cx="669614" cy="206212"/>
             </a:xfrm>
             <a:prstGeom prst="roundRect">
               <a:avLst/>
@@ -4374,8 +4314,8 @@
           </p:nvSpPr>
           <p:spPr>
             <a:xfrm>
-              <a:off x="1889125" y="1044018"/>
-              <a:ext cx="543739" cy="307777"/>
+              <a:off x="2516035" y="1076950"/>
+              <a:ext cx="441146" cy="246221"/>
             </a:xfrm>
             <a:prstGeom prst="rect">
               <a:avLst/>
@@ -4389,14 +4329,14 @@
             <a:lstStyle/>
             <a:p>
               <a:r>
-                <a:rPr lang="ja-JP" altLang="en-US" sz="1400" dirty="0" smtClean="0">
+                <a:rPr lang="ja-JP" altLang="en-US" sz="1000" dirty="0" smtClean="0">
                   <a:latin typeface="メイリオ"/>
                   <a:ea typeface="メイリオ"/>
                   <a:cs typeface="メイリオ"/>
                 </a:rPr>
                 <a:t>内容</a:t>
               </a:r>
-              <a:endParaRPr kumimoji="1" lang="ja-JP" altLang="en-US" sz="1400" dirty="0">
+              <a:endParaRPr kumimoji="1" lang="ja-JP" altLang="en-US" sz="1000" dirty="0">
                 <a:latin typeface="メイリオ"/>
                 <a:ea typeface="メイリオ"/>
                 <a:cs typeface="メイリオ"/>
@@ -4412,8 +4352,8 @@
           </p:nvSpPr>
           <p:spPr>
             <a:xfrm>
-              <a:off x="1077487" y="1095609"/>
-              <a:ext cx="799543" cy="210618"/>
+              <a:off x="917557" y="1101512"/>
+              <a:ext cx="642786" cy="209606"/>
             </a:xfrm>
             <a:prstGeom prst="roundRect">
               <a:avLst/>
@@ -4464,8 +4404,8 @@
           </p:nvSpPr>
           <p:spPr>
             <a:xfrm>
-              <a:off x="534136" y="1042529"/>
-              <a:ext cx="543739" cy="307777"/>
+              <a:off x="499501" y="1064825"/>
+              <a:ext cx="441146" cy="246221"/>
             </a:xfrm>
             <a:prstGeom prst="rect">
               <a:avLst/>
@@ -4479,14 +4419,14 @@
             <a:lstStyle/>
             <a:p>
               <a:r>
-                <a:rPr lang="ja-JP" altLang="en-US" sz="1400" dirty="0" smtClean="0">
+                <a:rPr lang="ja-JP" altLang="en-US" sz="1000" dirty="0" smtClean="0">
                   <a:latin typeface="メイリオ"/>
                   <a:ea typeface="メイリオ"/>
                   <a:cs typeface="メイリオ"/>
                 </a:rPr>
                 <a:t>日付</a:t>
               </a:r>
-              <a:endParaRPr kumimoji="1" lang="ja-JP" altLang="en-US" sz="1400" dirty="0">
+              <a:endParaRPr kumimoji="1" lang="ja-JP" altLang="en-US" sz="1000" dirty="0">
                 <a:latin typeface="メイリオ"/>
                 <a:ea typeface="メイリオ"/>
                 <a:cs typeface="メイリオ"/>
@@ -4502,8 +4442,8 @@
           </p:nvSpPr>
           <p:spPr>
             <a:xfrm>
-              <a:off x="7211462" y="1095609"/>
-              <a:ext cx="1239653" cy="210618"/>
+              <a:off x="7897091" y="1095609"/>
+              <a:ext cx="554024" cy="210112"/>
             </a:xfrm>
             <a:prstGeom prst="roundRect">
               <a:avLst/>
@@ -4610,6 +4550,331 @@
                 <a:t>メッセージ表示</a:t>
               </a:r>
               <a:endParaRPr kumimoji="1" lang="ja-JP" altLang="en-US" sz="1400" dirty="0">
+                <a:solidFill>
+                  <a:srgbClr val="000000"/>
+                </a:solidFill>
+                <a:latin typeface="メイリオ"/>
+                <a:ea typeface="メイリオ"/>
+                <a:cs typeface="メイリオ"/>
+              </a:endParaRPr>
+            </a:p>
+          </p:txBody>
+        </p:sp>
+        <p:sp>
+          <p:nvSpPr>
+            <p:cNvPr id="4" name="テキスト ボックス 3"/>
+            <p:cNvSpPr txBox="1"/>
+            <p:nvPr/>
+          </p:nvSpPr>
+          <p:spPr>
+            <a:xfrm>
+              <a:off x="6831667" y="1083557"/>
+              <a:ext cx="312906" cy="246221"/>
+            </a:xfrm>
+            <a:prstGeom prst="rect">
+              <a:avLst/>
+            </a:prstGeom>
+            <a:noFill/>
+          </p:spPr>
+          <p:txBody>
+            <a:bodyPr wrap="none" rtlCol="0">
+              <a:spAutoFit/>
+            </a:bodyPr>
+            <a:lstStyle/>
+            <a:p>
+              <a:r>
+                <a:rPr kumimoji="1" lang="en-US" altLang="ja-JP" sz="1000" dirty="0" smtClean="0"/>
+                <a:t>〜</a:t>
+              </a:r>
+              <a:endParaRPr kumimoji="1" lang="ja-JP" altLang="en-US" sz="1000" dirty="0"/>
+            </a:p>
+          </p:txBody>
+        </p:sp>
+        <p:sp>
+          <p:nvSpPr>
+            <p:cNvPr id="24" name="テキスト ボックス 23"/>
+            <p:cNvSpPr txBox="1"/>
+            <p:nvPr/>
+          </p:nvSpPr>
+          <p:spPr>
+            <a:xfrm>
+              <a:off x="1560343" y="1076371"/>
+              <a:ext cx="312906" cy="246221"/>
+            </a:xfrm>
+            <a:prstGeom prst="rect">
+              <a:avLst/>
+            </a:prstGeom>
+            <a:noFill/>
+          </p:spPr>
+          <p:txBody>
+            <a:bodyPr wrap="none" rtlCol="0">
+              <a:spAutoFit/>
+            </a:bodyPr>
+            <a:lstStyle/>
+            <a:p>
+              <a:r>
+                <a:rPr kumimoji="1" lang="en-US" altLang="ja-JP" sz="1000" dirty="0" smtClean="0"/>
+                <a:t>〜</a:t>
+              </a:r>
+              <a:endParaRPr kumimoji="1" lang="ja-JP" altLang="en-US" sz="1000" dirty="0"/>
+            </a:p>
+          </p:txBody>
+        </p:sp>
+        <p:sp>
+          <p:nvSpPr>
+            <p:cNvPr id="25" name="角丸四角形 24"/>
+            <p:cNvSpPr/>
+            <p:nvPr/>
+          </p:nvSpPr>
+          <p:spPr>
+            <a:xfrm>
+              <a:off x="1873249" y="1097215"/>
+              <a:ext cx="642786" cy="209606"/>
+            </a:xfrm>
+            <a:prstGeom prst="roundRect">
+              <a:avLst/>
+            </a:prstGeom>
+            <a:noFill/>
+            <a:ln w="25400">
+              <a:solidFill>
+                <a:schemeClr val="tx1"/>
+              </a:solidFill>
+            </a:ln>
+            <a:effectLst/>
+          </p:spPr>
+          <p:style>
+            <a:lnRef idx="1">
+              <a:schemeClr val="accent1"/>
+            </a:lnRef>
+            <a:fillRef idx="3">
+              <a:schemeClr val="accent1"/>
+            </a:fillRef>
+            <a:effectRef idx="2">
+              <a:schemeClr val="accent1"/>
+            </a:effectRef>
+            <a:fontRef idx="minor">
+              <a:schemeClr val="lt1"/>
+            </a:fontRef>
+          </p:style>
+          <p:txBody>
+            <a:bodyPr rtlCol="0" anchor="ctr"/>
+            <a:lstStyle/>
+            <a:p>
+              <a:pPr algn="ctr"/>
+              <a:endParaRPr kumimoji="1" lang="ja-JP" altLang="en-US" dirty="0">
+                <a:solidFill>
+                  <a:srgbClr val="000000"/>
+                </a:solidFill>
+                <a:latin typeface="メイリオ"/>
+                <a:ea typeface="メイリオ"/>
+                <a:cs typeface="メイリオ"/>
+              </a:endParaRPr>
+            </a:p>
+          </p:txBody>
+        </p:sp>
+        <p:sp>
+          <p:nvSpPr>
+            <p:cNvPr id="26" name="角丸四角形 25"/>
+            <p:cNvSpPr/>
+            <p:nvPr/>
+          </p:nvSpPr>
+          <p:spPr>
+            <a:xfrm>
+              <a:off x="3661177" y="1101512"/>
+              <a:ext cx="910482" cy="203703"/>
+            </a:xfrm>
+            <a:prstGeom prst="roundRect">
+              <a:avLst/>
+            </a:prstGeom>
+            <a:noFill/>
+            <a:ln w="25400">
+              <a:solidFill>
+                <a:schemeClr val="tx1"/>
+              </a:solidFill>
+            </a:ln>
+            <a:effectLst/>
+          </p:spPr>
+          <p:style>
+            <a:lnRef idx="1">
+              <a:schemeClr val="accent1"/>
+            </a:lnRef>
+            <a:fillRef idx="3">
+              <a:schemeClr val="accent1"/>
+            </a:fillRef>
+            <a:effectRef idx="2">
+              <a:schemeClr val="accent1"/>
+            </a:effectRef>
+            <a:fontRef idx="minor">
+              <a:schemeClr val="lt1"/>
+            </a:fontRef>
+          </p:style>
+          <p:txBody>
+            <a:bodyPr rtlCol="0" anchor="ctr"/>
+            <a:lstStyle/>
+            <a:p>
+              <a:r>
+                <a:rPr lang="ja-JP" altLang="en-US" sz="800" dirty="0" smtClean="0">
+                  <a:solidFill>
+                    <a:srgbClr val="000000"/>
+                  </a:solidFill>
+                  <a:latin typeface="メイリオ"/>
+                  <a:ea typeface="メイリオ"/>
+                  <a:cs typeface="メイリオ"/>
+                </a:rPr>
+                <a:t>と一致する</a:t>
+              </a:r>
+              <a:endParaRPr kumimoji="1" lang="ja-JP" altLang="en-US" sz="800" dirty="0">
+                <a:solidFill>
+                  <a:srgbClr val="000000"/>
+                </a:solidFill>
+                <a:latin typeface="メイリオ"/>
+                <a:ea typeface="メイリオ"/>
+                <a:cs typeface="メイリオ"/>
+              </a:endParaRPr>
+            </a:p>
+          </p:txBody>
+        </p:sp>
+        <p:sp>
+          <p:nvSpPr>
+            <p:cNvPr id="7" name="二等辺三角形 6"/>
+            <p:cNvSpPr/>
+            <p:nvPr/>
+          </p:nvSpPr>
+          <p:spPr>
+            <a:xfrm flipH="1" flipV="1">
+              <a:off x="4381832" y="1148614"/>
+              <a:ext cx="108000" cy="108000"/>
+            </a:xfrm>
+            <a:prstGeom prst="triangle">
+              <a:avLst/>
+            </a:prstGeom>
+            <a:solidFill>
+              <a:schemeClr val="tx1"/>
+            </a:solidFill>
+            <a:ln>
+              <a:solidFill>
+                <a:schemeClr val="tx1"/>
+              </a:solidFill>
+            </a:ln>
+            <a:effectLst/>
+          </p:spPr>
+          <p:style>
+            <a:lnRef idx="1">
+              <a:schemeClr val="accent1"/>
+            </a:lnRef>
+            <a:fillRef idx="3">
+              <a:schemeClr val="accent1"/>
+            </a:fillRef>
+            <a:effectRef idx="2">
+              <a:schemeClr val="accent1"/>
+            </a:effectRef>
+            <a:fontRef idx="minor">
+              <a:schemeClr val="lt1"/>
+            </a:fontRef>
+          </p:style>
+          <p:txBody>
+            <a:bodyPr rtlCol="0" anchor="ctr"/>
+            <a:lstStyle/>
+            <a:p>
+              <a:pPr algn="ctr"/>
+              <a:endParaRPr kumimoji="1" lang="ja-JP" altLang="en-US"/>
+            </a:p>
+          </p:txBody>
+        </p:sp>
+        <p:sp>
+          <p:nvSpPr>
+            <p:cNvPr id="27" name="角丸四角形 26"/>
+            <p:cNvSpPr/>
+            <p:nvPr/>
+          </p:nvSpPr>
+          <p:spPr>
+            <a:xfrm>
+              <a:off x="6206129" y="1091915"/>
+              <a:ext cx="642786" cy="209606"/>
+            </a:xfrm>
+            <a:prstGeom prst="roundRect">
+              <a:avLst/>
+            </a:prstGeom>
+            <a:noFill/>
+            <a:ln w="25400">
+              <a:solidFill>
+                <a:schemeClr val="tx1"/>
+              </a:solidFill>
+            </a:ln>
+            <a:effectLst/>
+          </p:spPr>
+          <p:style>
+            <a:lnRef idx="1">
+              <a:schemeClr val="accent1"/>
+            </a:lnRef>
+            <a:fillRef idx="3">
+              <a:schemeClr val="accent1"/>
+            </a:fillRef>
+            <a:effectRef idx="2">
+              <a:schemeClr val="accent1"/>
+            </a:effectRef>
+            <a:fontRef idx="minor">
+              <a:schemeClr val="lt1"/>
+            </a:fontRef>
+          </p:style>
+          <p:txBody>
+            <a:bodyPr rtlCol="0" anchor="ctr"/>
+            <a:lstStyle/>
+            <a:p>
+              <a:pPr algn="ctr"/>
+              <a:endParaRPr kumimoji="1" lang="ja-JP" altLang="en-US" dirty="0">
+                <a:solidFill>
+                  <a:srgbClr val="000000"/>
+                </a:solidFill>
+                <a:latin typeface="メイリオ"/>
+                <a:ea typeface="メイリオ"/>
+                <a:cs typeface="メイリオ"/>
+              </a:endParaRPr>
+            </a:p>
+          </p:txBody>
+        </p:sp>
+        <p:sp>
+          <p:nvSpPr>
+            <p:cNvPr id="28" name="角丸四角形 27"/>
+            <p:cNvSpPr/>
+            <p:nvPr/>
+          </p:nvSpPr>
+          <p:spPr>
+            <a:xfrm>
+              <a:off x="7123189" y="1091915"/>
+              <a:ext cx="642786" cy="209606"/>
+            </a:xfrm>
+            <a:prstGeom prst="roundRect">
+              <a:avLst/>
+            </a:prstGeom>
+            <a:noFill/>
+            <a:ln w="25400">
+              <a:solidFill>
+                <a:schemeClr val="tx1"/>
+              </a:solidFill>
+            </a:ln>
+            <a:effectLst/>
+          </p:spPr>
+          <p:style>
+            <a:lnRef idx="1">
+              <a:schemeClr val="accent1"/>
+            </a:lnRef>
+            <a:fillRef idx="3">
+              <a:schemeClr val="accent1"/>
+            </a:fillRef>
+            <a:effectRef idx="2">
+              <a:schemeClr val="accent1"/>
+            </a:effectRef>
+            <a:fontRef idx="minor">
+              <a:schemeClr val="lt1"/>
+            </a:fontRef>
+          </p:style>
+          <p:txBody>
+            <a:bodyPr rtlCol="0" anchor="ctr"/>
+            <a:lstStyle/>
+            <a:p>
+              <a:pPr algn="ctr"/>
+              <a:endParaRPr kumimoji="1" lang="ja-JP" altLang="en-US" dirty="0">
                 <a:solidFill>
                   <a:srgbClr val="000000"/>
                 </a:solidFill>

</xml_diff>